<commit_message>
Typo cox spaneng gue
</commit_message>
<xml_diff>
--- a/documents/FP.pptx
+++ b/documents/FP.pptx
@@ -317,7 +317,7 @@
           <a:p>
             <a:fld id="{7C1D9325-50D3-4F8B-B508-1ACAE68C2CBB}" type="datetimeFigureOut">
               <a:rPr lang="en-US" smtClean="0"/>
-              <a:t>5/24/2016</a:t>
+              <a:t>5/25/2016</a:t>
             </a:fld>
             <a:endParaRPr lang="en-US"/>
           </a:p>
@@ -655,7 +655,7 @@
           <a:p>
             <a:fld id="{7C1D9325-50D3-4F8B-B508-1ACAE68C2CBB}" type="datetimeFigureOut">
               <a:rPr lang="en-US" smtClean="0"/>
-              <a:t>5/24/2016</a:t>
+              <a:t>5/25/2016</a:t>
             </a:fld>
             <a:endParaRPr lang="en-US"/>
           </a:p>
@@ -1056,7 +1056,7 @@
           <a:p>
             <a:fld id="{7C1D9325-50D3-4F8B-B508-1ACAE68C2CBB}" type="datetimeFigureOut">
               <a:rPr lang="en-US" smtClean="0"/>
-              <a:t>5/24/2016</a:t>
+              <a:t>5/25/2016</a:t>
             </a:fld>
             <a:endParaRPr lang="en-US"/>
           </a:p>
@@ -1392,7 +1392,7 @@
           <a:p>
             <a:fld id="{7C1D9325-50D3-4F8B-B508-1ACAE68C2CBB}" type="datetimeFigureOut">
               <a:rPr lang="en-US" smtClean="0"/>
-              <a:t>5/24/2016</a:t>
+              <a:t>5/25/2016</a:t>
             </a:fld>
             <a:endParaRPr lang="en-US"/>
           </a:p>
@@ -1712,7 +1712,7 @@
           <a:p>
             <a:fld id="{7C1D9325-50D3-4F8B-B508-1ACAE68C2CBB}" type="datetimeFigureOut">
               <a:rPr lang="en-US" smtClean="0"/>
-              <a:t>5/24/2016</a:t>
+              <a:t>5/25/2016</a:t>
             </a:fld>
             <a:endParaRPr lang="en-US"/>
           </a:p>
@@ -2108,7 +2108,7 @@
           <a:p>
             <a:fld id="{7C1D9325-50D3-4F8B-B508-1ACAE68C2CBB}" type="datetimeFigureOut">
               <a:rPr lang="en-US" smtClean="0"/>
-              <a:t>5/24/2016</a:t>
+              <a:t>5/25/2016</a:t>
             </a:fld>
             <a:endParaRPr lang="en-US"/>
           </a:p>
@@ -2365,7 +2365,7 @@
           <a:p>
             <a:fld id="{7C1D9325-50D3-4F8B-B508-1ACAE68C2CBB}" type="datetimeFigureOut">
               <a:rPr lang="en-US" smtClean="0"/>
-              <a:t>5/24/2016</a:t>
+              <a:t>5/25/2016</a:t>
             </a:fld>
             <a:endParaRPr lang="en-US"/>
           </a:p>
@@ -2627,7 +2627,7 @@
           <a:p>
             <a:fld id="{7C1D9325-50D3-4F8B-B508-1ACAE68C2CBB}" type="datetimeFigureOut">
               <a:rPr lang="en-US" smtClean="0"/>
-              <a:t>5/24/2016</a:t>
+              <a:t>5/25/2016</a:t>
             </a:fld>
             <a:endParaRPr lang="en-US"/>
           </a:p>
@@ -2889,7 +2889,7 @@
           <a:p>
             <a:fld id="{7C1D9325-50D3-4F8B-B508-1ACAE68C2CBB}" type="datetimeFigureOut">
               <a:rPr lang="en-US" smtClean="0"/>
-              <a:t>5/24/2016</a:t>
+              <a:t>5/25/2016</a:t>
             </a:fld>
             <a:endParaRPr lang="en-US"/>
           </a:p>
@@ -3218,7 +3218,7 @@
           <a:p>
             <a:fld id="{7C1D9325-50D3-4F8B-B508-1ACAE68C2CBB}" type="datetimeFigureOut">
               <a:rPr lang="en-US" smtClean="0"/>
-              <a:t>5/24/2016</a:t>
+              <a:t>5/25/2016</a:t>
             </a:fld>
             <a:endParaRPr lang="en-US"/>
           </a:p>
@@ -3541,7 +3541,7 @@
           <a:p>
             <a:fld id="{7C1D9325-50D3-4F8B-B508-1ACAE68C2CBB}" type="datetimeFigureOut">
               <a:rPr lang="en-US" smtClean="0"/>
-              <a:t>5/24/2016</a:t>
+              <a:t>5/25/2016</a:t>
             </a:fld>
             <a:endParaRPr lang="en-US"/>
           </a:p>
@@ -3998,7 +3998,7 @@
           <a:p>
             <a:fld id="{7C1D9325-50D3-4F8B-B508-1ACAE68C2CBB}" type="datetimeFigureOut">
               <a:rPr lang="en-US" smtClean="0"/>
-              <a:t>5/24/2016</a:t>
+              <a:t>5/25/2016</a:t>
             </a:fld>
             <a:endParaRPr lang="en-US"/>
           </a:p>
@@ -4203,7 +4203,7 @@
           <a:p>
             <a:fld id="{7C1D9325-50D3-4F8B-B508-1ACAE68C2CBB}" type="datetimeFigureOut">
               <a:rPr lang="en-US" smtClean="0"/>
-              <a:t>5/24/2016</a:t>
+              <a:t>5/25/2016</a:t>
             </a:fld>
             <a:endParaRPr lang="en-US"/>
           </a:p>
@@ -4380,7 +4380,7 @@
           <a:p>
             <a:fld id="{7C1D9325-50D3-4F8B-B508-1ACAE68C2CBB}" type="datetimeFigureOut">
               <a:rPr lang="en-US" smtClean="0"/>
-              <a:t>5/24/2016</a:t>
+              <a:t>5/25/2016</a:t>
             </a:fld>
             <a:endParaRPr lang="en-US"/>
           </a:p>
@@ -4713,7 +4713,7 @@
           <a:p>
             <a:fld id="{7C1D9325-50D3-4F8B-B508-1ACAE68C2CBB}" type="datetimeFigureOut">
               <a:rPr lang="en-US" smtClean="0"/>
-              <a:t>5/24/2016</a:t>
+              <a:t>5/25/2016</a:t>
             </a:fld>
             <a:endParaRPr lang="en-US"/>
           </a:p>
@@ -5058,7 +5058,7 @@
           <a:p>
             <a:fld id="{7C1D9325-50D3-4F8B-B508-1ACAE68C2CBB}" type="datetimeFigureOut">
               <a:rPr lang="en-US" smtClean="0"/>
-              <a:t>5/24/2016</a:t>
+              <a:t>5/25/2016</a:t>
             </a:fld>
             <a:endParaRPr lang="en-US"/>
           </a:p>
@@ -7175,7 +7175,7 @@
           <a:p>
             <a:fld id="{7C1D9325-50D3-4F8B-B508-1ACAE68C2CBB}" type="datetimeFigureOut">
               <a:rPr lang="en-US" smtClean="0"/>
-              <a:t>5/24/2016</a:t>
+              <a:t>5/25/2016</a:t>
             </a:fld>
             <a:endParaRPr lang="en-US"/>
           </a:p>
@@ -12202,8 +12202,8 @@
               <a:t> </a:t>
             </a:r>
             <a:r>
-              <a:rPr lang="en-US" b="1" dirty="0" err="1" smtClean="0"/>
-              <a:t>terisi</a:t>
+              <a:rPr lang="en-US" b="1" smtClean="0"/>
+              <a:t>kosong</a:t>
             </a:r>
             <a:r>
               <a:rPr lang="en-US" dirty="0" smtClean="0"/>

</xml_diff>